<commit_message>
add ppt for 2016 technical report
</commit_message>
<xml_diff>
--- a/Resources/poster/poster.pptx
+++ b/Resources/poster/poster.pptx
@@ -195,7 +195,7 @@
             <a:fld id="{3A717201-49CA-46AE-A68E-D969A1D8D135}" type="datetimeFigureOut">
               <a:rPr lang="zh-CN" altLang="en-US" smtClean="0"/>
               <a:pPr/>
-              <a:t>2016/12/4</a:t>
+              <a:t>2016/12/31</a:t>
             </a:fld>
             <a:endParaRPr lang="zh-CN" altLang="en-US"/>
           </a:p>
@@ -643,7 +643,7 @@
             <a:fld id="{7CDCBD02-D446-496C-BEC0-2B552561EEEE}" type="datetimeFigureOut">
               <a:rPr lang="zh-CN" altLang="en-US" smtClean="0"/>
               <a:pPr/>
-              <a:t>2016/12/4</a:t>
+              <a:t>2016/12/31</a:t>
             </a:fld>
             <a:endParaRPr lang="zh-CN" altLang="en-US"/>
           </a:p>
@@ -810,7 +810,7 @@
             <a:fld id="{7CDCBD02-D446-496C-BEC0-2B552561EEEE}" type="datetimeFigureOut">
               <a:rPr lang="zh-CN" altLang="en-US" smtClean="0"/>
               <a:pPr/>
-              <a:t>2016/12/4</a:t>
+              <a:t>2016/12/31</a:t>
             </a:fld>
             <a:endParaRPr lang="zh-CN" altLang="en-US"/>
           </a:p>
@@ -987,7 +987,7 @@
             <a:fld id="{7CDCBD02-D446-496C-BEC0-2B552561EEEE}" type="datetimeFigureOut">
               <a:rPr lang="zh-CN" altLang="en-US" smtClean="0"/>
               <a:pPr/>
-              <a:t>2016/12/4</a:t>
+              <a:t>2016/12/31</a:t>
             </a:fld>
             <a:endParaRPr lang="zh-CN" altLang="en-US"/>
           </a:p>
@@ -1154,7 +1154,7 @@
             <a:fld id="{7CDCBD02-D446-496C-BEC0-2B552561EEEE}" type="datetimeFigureOut">
               <a:rPr lang="zh-CN" altLang="en-US" smtClean="0"/>
               <a:pPr/>
-              <a:t>2016/12/4</a:t>
+              <a:t>2016/12/31</a:t>
             </a:fld>
             <a:endParaRPr lang="zh-CN" altLang="en-US"/>
           </a:p>
@@ -1397,7 +1397,7 @@
             <a:fld id="{7CDCBD02-D446-496C-BEC0-2B552561EEEE}" type="datetimeFigureOut">
               <a:rPr lang="zh-CN" altLang="en-US" smtClean="0"/>
               <a:pPr/>
-              <a:t>2016/12/4</a:t>
+              <a:t>2016/12/31</a:t>
             </a:fld>
             <a:endParaRPr lang="zh-CN" altLang="en-US"/>
           </a:p>
@@ -1682,7 +1682,7 @@
             <a:fld id="{7CDCBD02-D446-496C-BEC0-2B552561EEEE}" type="datetimeFigureOut">
               <a:rPr lang="zh-CN" altLang="en-US" smtClean="0"/>
               <a:pPr/>
-              <a:t>2016/12/4</a:t>
+              <a:t>2016/12/31</a:t>
             </a:fld>
             <a:endParaRPr lang="zh-CN" altLang="en-US"/>
           </a:p>
@@ -2101,7 +2101,7 @@
             <a:fld id="{7CDCBD02-D446-496C-BEC0-2B552561EEEE}" type="datetimeFigureOut">
               <a:rPr lang="zh-CN" altLang="en-US" smtClean="0"/>
               <a:pPr/>
-              <a:t>2016/12/4</a:t>
+              <a:t>2016/12/31</a:t>
             </a:fld>
             <a:endParaRPr lang="zh-CN" altLang="en-US"/>
           </a:p>
@@ -2216,7 +2216,7 @@
             <a:fld id="{7CDCBD02-D446-496C-BEC0-2B552561EEEE}" type="datetimeFigureOut">
               <a:rPr lang="zh-CN" altLang="en-US" smtClean="0"/>
               <a:pPr/>
-              <a:t>2016/12/4</a:t>
+              <a:t>2016/12/31</a:t>
             </a:fld>
             <a:endParaRPr lang="zh-CN" altLang="en-US"/>
           </a:p>
@@ -2308,7 +2308,7 @@
             <a:fld id="{7CDCBD02-D446-496C-BEC0-2B552561EEEE}" type="datetimeFigureOut">
               <a:rPr lang="zh-CN" altLang="en-US" smtClean="0"/>
               <a:pPr/>
-              <a:t>2016/12/4</a:t>
+              <a:t>2016/12/31</a:t>
             </a:fld>
             <a:endParaRPr lang="zh-CN" altLang="en-US"/>
           </a:p>
@@ -2582,7 +2582,7 @@
             <a:fld id="{7CDCBD02-D446-496C-BEC0-2B552561EEEE}" type="datetimeFigureOut">
               <a:rPr lang="zh-CN" altLang="en-US" smtClean="0"/>
               <a:pPr/>
-              <a:t>2016/12/4</a:t>
+              <a:t>2016/12/31</a:t>
             </a:fld>
             <a:endParaRPr lang="zh-CN" altLang="en-US"/>
           </a:p>
@@ -2832,7 +2832,7 @@
             <a:fld id="{7CDCBD02-D446-496C-BEC0-2B552561EEEE}" type="datetimeFigureOut">
               <a:rPr lang="zh-CN" altLang="en-US" smtClean="0"/>
               <a:pPr/>
-              <a:t>2016/12/4</a:t>
+              <a:t>2016/12/31</a:t>
             </a:fld>
             <a:endParaRPr lang="zh-CN" altLang="en-US"/>
           </a:p>
@@ -3042,7 +3042,7 @@
             <a:fld id="{7CDCBD02-D446-496C-BEC0-2B552561EEEE}" type="datetimeFigureOut">
               <a:rPr lang="zh-CN" altLang="en-US" smtClean="0"/>
               <a:pPr/>
-              <a:t>2016/12/4</a:t>
+              <a:t>2016/12/31</a:t>
             </a:fld>
             <a:endParaRPr lang="zh-CN" altLang="en-US"/>
           </a:p>
@@ -6344,6 +6344,169 @@
             <a:p>
               <a:pPr algn="ctr"/>
               <a:endParaRPr lang="zh-CN" altLang="en-US"/>
+            </a:p>
+          </p:txBody>
+        </p:sp>
+      </p:grpSp>
+      <p:grpSp>
+        <p:nvGrpSpPr>
+          <p:cNvPr id="28" name="组 96"/>
+          <p:cNvGrpSpPr/>
+          <p:nvPr/>
+        </p:nvGrpSpPr>
+        <p:grpSpPr>
+          <a:xfrm>
+            <a:off x="857224" y="714356"/>
+            <a:ext cx="1363136" cy="1363136"/>
+            <a:chOff x="5446394" y="1162855"/>
+            <a:chExt cx="815044" cy="815044"/>
+          </a:xfrm>
+          <a:effectLst>
+            <a:outerShdw blurRad="50800" dist="38100" dir="5400000" algn="t" rotWithShape="0">
+              <a:prstClr val="black">
+                <a:alpha val="40000"/>
+              </a:prstClr>
+            </a:outerShdw>
+          </a:effectLst>
+        </p:grpSpPr>
+        <p:sp>
+          <p:nvSpPr>
+            <p:cNvPr id="29" name="椭圆 28"/>
+            <p:cNvSpPr/>
+            <p:nvPr/>
+          </p:nvSpPr>
+          <p:spPr>
+            <a:xfrm>
+              <a:off x="5446394" y="1162855"/>
+              <a:ext cx="815044" cy="815044"/>
+            </a:xfrm>
+            <a:prstGeom prst="ellipse">
+              <a:avLst/>
+            </a:prstGeom>
+            <a:solidFill>
+              <a:srgbClr val="F9F5EE"/>
+            </a:solidFill>
+            <a:ln w="9525" cap="flat" cmpd="sng" algn="ctr">
+              <a:noFill/>
+              <a:prstDash val="solid"/>
+            </a:ln>
+            <a:effectLst/>
+          </p:spPr>
+          <p:txBody>
+            <a:bodyPr rtlCol="0" anchor="ctr"/>
+            <a:lstStyle/>
+            <a:p>
+              <a:pPr marL="0" marR="0" lvl="0" indent="0" algn="ctr" defTabSz="609585" eaLnBrk="1" fontAlgn="auto" latinLnBrk="0" hangingPunct="1">
+                <a:lnSpc>
+                  <a:spcPct val="100000"/>
+                </a:lnSpc>
+                <a:spcBef>
+                  <a:spcPts val="0"/>
+                </a:spcBef>
+                <a:spcAft>
+                  <a:spcPts val="0"/>
+                </a:spcAft>
+                <a:buClrTx/>
+                <a:buSzTx/>
+                <a:buFontTx/>
+                <a:buNone/>
+                <a:tabLst/>
+                <a:defRPr/>
+              </a:pPr>
+              <a:endParaRPr kumimoji="1" lang="zh-CN" altLang="en-US" sz="3200" b="0" i="0" u="none" strike="noStrike" kern="0" cap="none" spc="0" normalizeH="0" baseline="0" noProof="0" smtClean="0">
+                <a:ln>
+                  <a:noFill/>
+                </a:ln>
+                <a:solidFill>
+                  <a:srgbClr val="F9F5EE"/>
+                </a:solidFill>
+                <a:effectLst/>
+                <a:uLnTx/>
+                <a:uFillTx/>
+                <a:latin typeface="Century Gothic"/>
+                <a:ea typeface="微软雅黑"/>
+                <a:cs typeface=""/>
+              </a:endParaRPr>
+            </a:p>
+          </p:txBody>
+        </p:sp>
+        <p:sp>
+          <p:nvSpPr>
+            <p:cNvPr id="30" name="椭圆 29"/>
+            <p:cNvSpPr/>
+            <p:nvPr/>
+          </p:nvSpPr>
+          <p:spPr>
+            <a:xfrm>
+              <a:off x="5523503" y="1239965"/>
+              <a:ext cx="660826" cy="660825"/>
+            </a:xfrm>
+            <a:prstGeom prst="ellipse">
+              <a:avLst/>
+            </a:prstGeom>
+            <a:solidFill>
+              <a:srgbClr val="FB5F63">
+                <a:alpha val="85000"/>
+              </a:srgbClr>
+            </a:solidFill>
+            <a:ln w="9525" cap="flat" cmpd="sng" algn="ctr">
+              <a:noFill/>
+              <a:prstDash val="solid"/>
+            </a:ln>
+            <a:effectLst/>
+          </p:spPr>
+          <p:txBody>
+            <a:bodyPr rtlCol="0" anchor="ctr"/>
+            <a:lstStyle/>
+            <a:p>
+              <a:pPr marL="0" marR="0" lvl="0" indent="0" algn="ctr" defTabSz="609585" eaLnBrk="1" fontAlgn="auto" latinLnBrk="0" hangingPunct="1">
+                <a:lnSpc>
+                  <a:spcPct val="90000"/>
+                </a:lnSpc>
+                <a:spcBef>
+                  <a:spcPts val="0"/>
+                </a:spcBef>
+                <a:spcAft>
+                  <a:spcPts val="0"/>
+                </a:spcAft>
+                <a:buClrTx/>
+                <a:buSzTx/>
+                <a:buFontTx/>
+                <a:buNone/>
+                <a:tabLst/>
+                <a:defRPr/>
+              </a:pPr>
+              <a:r>
+                <a:rPr kumimoji="1" lang="en-US" altLang="zh-CN" sz="6400" b="1" i="0" u="none" strike="noStrike" kern="0" cap="none" spc="0" normalizeH="0" baseline="0" noProof="0" dirty="0" smtClean="0">
+                  <a:ln>
+                    <a:noFill/>
+                  </a:ln>
+                  <a:solidFill>
+                    <a:srgbClr val="F9F5EE"/>
+                  </a:solidFill>
+                  <a:effectLst/>
+                  <a:uLnTx/>
+                  <a:uFillTx/>
+                  <a:latin typeface="Century Gothic"/>
+                  <a:ea typeface="微软雅黑"/>
+                  <a:cs typeface=""/>
+                </a:rPr>
+                <a:t>1</a:t>
+              </a:r>
+              <a:endParaRPr kumimoji="1" lang="zh-CN" altLang="en-US" sz="6400" b="1" i="0" u="none" strike="noStrike" kern="0" cap="none" spc="0" normalizeH="0" baseline="0" noProof="0" dirty="0" smtClean="0">
+                <a:ln>
+                  <a:noFill/>
+                </a:ln>
+                <a:solidFill>
+                  <a:srgbClr val="F9F5EE"/>
+                </a:solidFill>
+                <a:effectLst/>
+                <a:uLnTx/>
+                <a:uFillTx/>
+                <a:latin typeface="Century Gothic"/>
+                <a:ea typeface="微软雅黑"/>
+                <a:cs typeface=""/>
+              </a:endParaRPr>
             </a:p>
           </p:txBody>
         </p:sp>

</xml_diff>